<commit_message>
Did some work in key lessons and future work
</commit_message>
<xml_diff>
--- a/presentation/Demo_day_redhat_alon_rubi.pptx
+++ b/presentation/Demo_day_redhat_alon_rubi.pptx
@@ -120,6 +120,9 @@
     <p:ext uri="{EFAFB233-063F-42B5-8137-9DF3F51BA10A}">
       <p15:sldGuideLst xmlns:p15="http://schemas.microsoft.com/office/powerpoint/2012/main"/>
     </p:ext>
+    <p:ext uri="{2D200454-40CA-4A62-9FC3-DE9A4176ACB9}">
+      <p15:notesGuideLst xmlns:p15="http://schemas.microsoft.com/office/powerpoint/2012/main"/>
+    </p:ext>
   </p:extLst>
 </p:presentation>
 </file>
@@ -706,6 +709,220 @@
 </p:notes>
 </file>
 
+<file path=ppt/notesSlides/notesSlide3.xml><?xml version="1.0" encoding="utf-8"?>
+<p:notes xmlns:a="http://schemas.openxmlformats.org/drawingml/2006/main" xmlns:r="http://schemas.openxmlformats.org/officeDocument/2006/relationships" xmlns:p="http://schemas.openxmlformats.org/presentationml/2006/main">
+  <p:cSld>
+    <p:spTree>
+      <p:nvGrpSpPr>
+        <p:cNvPr id="1" name=""/>
+        <p:cNvGrpSpPr/>
+        <p:nvPr/>
+      </p:nvGrpSpPr>
+      <p:grpSpPr>
+        <a:xfrm>
+          <a:off x="0" y="0"/>
+          <a:ext cx="0" cy="0"/>
+          <a:chOff x="0" y="0"/>
+          <a:chExt cx="0" cy="0"/>
+        </a:xfrm>
+      </p:grpSpPr>
+      <p:sp>
+        <p:nvSpPr>
+          <p:cNvPr id="2" name="מציין מיקום של תמונת שקופית 1"/>
+          <p:cNvSpPr>
+            <a:spLocks noGrp="1" noRot="1" noChangeAspect="1"/>
+          </p:cNvSpPr>
+          <p:nvPr>
+            <p:ph type="sldImg"/>
+          </p:nvPr>
+        </p:nvSpPr>
+        <p:spPr/>
+      </p:sp>
+      <p:sp>
+        <p:nvSpPr>
+          <p:cNvPr id="3" name="מציין מיקום של הערות 2"/>
+          <p:cNvSpPr>
+            <a:spLocks noGrp="1"/>
+          </p:cNvSpPr>
+          <p:nvPr>
+            <p:ph type="body" idx="1"/>
+          </p:nvPr>
+        </p:nvSpPr>
+        <p:spPr/>
+        <p:txBody>
+          <a:bodyPr/>
+          <a:lstStyle/>
+          <a:p>
+            <a:r>
+              <a:rPr lang="en-US" dirty="0" smtClean="0"/>
+              <a:t>Last in deed, but in thought – prime:</a:t>
+            </a:r>
+          </a:p>
+          <a:p>
+            <a:r>
+              <a:rPr lang="en-US" baseline="0" dirty="0" smtClean="0"/>
+              <a:t> - </a:t>
+            </a:r>
+            <a:r>
+              <a:rPr lang="en-US" dirty="0" smtClean="0"/>
+              <a:t>Plan your project with the forethought of running such a test selection scheme.</a:t>
+            </a:r>
+          </a:p>
+          <a:p>
+            <a:r>
+              <a:rPr lang="en-US" dirty="0" smtClean="0"/>
+              <a:t>	- Specifically in this project – any test run should be easily mapped to the file\s that host the test’s code</a:t>
+            </a:r>
+          </a:p>
+          <a:p>
+            <a:endParaRPr lang="en-US" dirty="0" smtClean="0"/>
+          </a:p>
+          <a:p>
+            <a:r>
+              <a:rPr lang="en-US" b="1" u="sng" dirty="0" smtClean="0"/>
+              <a:t>Balanced data matters</a:t>
+            </a:r>
+          </a:p>
+          <a:p>
+            <a:r>
+              <a:rPr lang="en-US" dirty="0" smtClean="0"/>
+              <a:t>Produce it in the first place – by far one</a:t>
+            </a:r>
+            <a:r>
+              <a:rPr lang="en-US" baseline="0" dirty="0" smtClean="0"/>
+              <a:t> of the most important insights! This methodology should be employed on code much earlier than just-before-its-</a:t>
+            </a:r>
+            <a:r>
+              <a:rPr lang="en-US" baseline="0" dirty="0" err="1" smtClean="0"/>
+              <a:t>PR’d</a:t>
+            </a:r>
+            <a:r>
+              <a:rPr lang="en-US" baseline="0" dirty="0" smtClean="0"/>
+              <a:t>-to-master-branch.</a:t>
+            </a:r>
+          </a:p>
+          <a:p>
+            <a:r>
+              <a:rPr lang="en-US" baseline="0" dirty="0" smtClean="0"/>
+              <a:t>This should run on yet-to-be-completely-stable code (i.e. much earlier in the CI\CD cycle).</a:t>
+            </a:r>
+          </a:p>
+          <a:p>
+            <a:r>
+              <a:rPr lang="en-US" baseline="0" dirty="0" smtClean="0"/>
+              <a:t>This has 2 bug advantages:</a:t>
+            </a:r>
+          </a:p>
+          <a:p>
+            <a:r>
+              <a:rPr lang="en-US" baseline="0" dirty="0" smtClean="0"/>
+              <a:t>	1) The data is more balanced</a:t>
+            </a:r>
+          </a:p>
+          <a:p>
+            <a:r>
+              <a:rPr lang="en-US" baseline="0" dirty="0" smtClean="0"/>
+              <a:t>	2) You catch mistakes much </a:t>
+            </a:r>
+            <a:r>
+              <a:rPr lang="en-US" baseline="0" dirty="0" err="1" smtClean="0"/>
+              <a:t>much</a:t>
+            </a:r>
+            <a:r>
+              <a:rPr lang="en-US" baseline="0" dirty="0" smtClean="0"/>
+              <a:t> earlier, thus reducing the overhead it takes to deal with them. It’s a know “axiom” in the industry that bugs being caught earlier are much less “expensive” (the normal hierarchy being developer-&gt;QA-&gt;Integration\E2E tests-&gt;Production</a:t>
+            </a:r>
+          </a:p>
+          <a:p>
+            <a:endParaRPr lang="en-US" baseline="0" dirty="0" smtClean="0"/>
+          </a:p>
+          <a:p>
+            <a:r>
+              <a:rPr lang="en-US" b="1" u="sng" dirty="0" smtClean="0"/>
+              <a:t>Compensate for unbalanced data</a:t>
+            </a:r>
+          </a:p>
+          <a:p>
+            <a:r>
+              <a:rPr lang="en-US" b="0" u="none" dirty="0" smtClean="0"/>
+              <a:t>There</a:t>
+            </a:r>
+            <a:r>
+              <a:rPr lang="en-US" b="0" u="none" baseline="0" dirty="0" smtClean="0"/>
+              <a:t> are a lot of ways. A few of them are:</a:t>
+            </a:r>
+          </a:p>
+          <a:p>
+            <a:r>
+              <a:rPr lang="en-US" b="0" u="none" baseline="0" dirty="0" smtClean="0"/>
+              <a:t> - Train your model in batches of balanced data</a:t>
+            </a:r>
+          </a:p>
+          <a:p>
+            <a:r>
+              <a:rPr lang="en-US" b="0" u="none" baseline="0" dirty="0" smtClean="0"/>
+              <a:t> - Cut samples from your data, making your data set </a:t>
+            </a:r>
+            <a:r>
+              <a:rPr lang="en-US" b="0" u="none" baseline="0" dirty="0" err="1" smtClean="0"/>
+              <a:t>smalland</a:t>
+            </a:r>
+            <a:r>
+              <a:rPr lang="en-US" b="0" u="none" baseline="0" dirty="0" smtClean="0"/>
+              <a:t> more balanced</a:t>
+            </a:r>
+          </a:p>
+          <a:p>
+            <a:r>
+              <a:rPr lang="en-US" b="0" u="none" baseline="0" dirty="0" smtClean="0"/>
+              <a:t> - Syntactically produce data of the smaller group. This is tricky and should be done with care – you don’t too much unusual data. For example in our case, it’s very easy to create code that fails a lot of tests – simply make the code not compile altogether (e.g. by deleting a semicolon). However that’s not a good idea since it’ll be highly unrepresentative of real world code changes.</a:t>
+            </a:r>
+            <a:endParaRPr lang="en-US" b="0" u="none" dirty="0" smtClean="0"/>
+          </a:p>
+          <a:p>
+            <a:endParaRPr lang="en-US" dirty="0" smtClean="0"/>
+          </a:p>
+          <a:p>
+            <a:endParaRPr lang="en-US" dirty="0"/>
+          </a:p>
+        </p:txBody>
+      </p:sp>
+      <p:sp>
+        <p:nvSpPr>
+          <p:cNvPr id="4" name="מציין מיקום של מספר שקופית 3"/>
+          <p:cNvSpPr>
+            <a:spLocks noGrp="1"/>
+          </p:cNvSpPr>
+          <p:nvPr>
+            <p:ph type="sldNum" sz="quarter" idx="10"/>
+          </p:nvPr>
+        </p:nvSpPr>
+        <p:spPr/>
+        <p:txBody>
+          <a:bodyPr/>
+          <a:lstStyle/>
+          <a:p>
+            <a:fld id="{5D97A975-964D-4C88-9C64-5635FC4A030A}" type="slidenum">
+              <a:rPr lang="en-US" smtClean="0"/>
+              <a:t>9</a:t>
+            </a:fld>
+            <a:endParaRPr lang="en-US"/>
+          </a:p>
+        </p:txBody>
+      </p:sp>
+    </p:spTree>
+    <p:extLst>
+      <p:ext uri="{BB962C8B-B14F-4D97-AF65-F5344CB8AC3E}">
+        <p14:creationId xmlns:p14="http://schemas.microsoft.com/office/powerpoint/2010/main" val="1757071743"/>
+      </p:ext>
+    </p:extLst>
+  </p:cSld>
+  <p:clrMapOvr>
+    <a:masterClrMapping/>
+  </p:clrMapOvr>
+</p:notes>
+</file>
+
 <file path=ppt/slideLayouts/slideLayout1.xml><?xml version="1.0" encoding="utf-8"?>
 <p:sldLayout xmlns:a="http://schemas.openxmlformats.org/drawingml/2006/main" xmlns:r="http://schemas.openxmlformats.org/officeDocument/2006/relationships" xmlns:p="http://schemas.openxmlformats.org/presentationml/2006/main" type="title" preserve="1">
   <p:cSld name="Title Slide">
@@ -728,7 +945,7 @@
           <p:cNvPr id="2" name="Title 1">
             <a:extLst>
               <a:ext uri="{FF2B5EF4-FFF2-40B4-BE49-F238E27FC236}">
-                <a16:creationId xmlns:a16="http://schemas.microsoft.com/office/drawing/2014/main" xmlns="" id="{94086813-6C64-4AE0-B0D6-06A418DB79AF}"/>
+                <a16:creationId xmlns="" xmlns:a16="http://schemas.microsoft.com/office/drawing/2014/main" id="{94086813-6C64-4AE0-B0D6-06A418DB79AF}"/>
               </a:ext>
             </a:extLst>
           </p:cNvPr>
@@ -766,7 +983,7 @@
           <p:cNvPr id="3" name="Subtitle 2">
             <a:extLst>
               <a:ext uri="{FF2B5EF4-FFF2-40B4-BE49-F238E27FC236}">
-                <a16:creationId xmlns:a16="http://schemas.microsoft.com/office/drawing/2014/main" xmlns="" id="{EC30D7A1-A922-4096-8082-00743C02B271}"/>
+                <a16:creationId xmlns="" xmlns:a16="http://schemas.microsoft.com/office/drawing/2014/main" id="{EC30D7A1-A922-4096-8082-00743C02B271}"/>
               </a:ext>
             </a:extLst>
           </p:cNvPr>
@@ -837,7 +1054,7 @@
           <p:cNvPr id="4" name="Date Placeholder 3">
             <a:extLst>
               <a:ext uri="{FF2B5EF4-FFF2-40B4-BE49-F238E27FC236}">
-                <a16:creationId xmlns:a16="http://schemas.microsoft.com/office/drawing/2014/main" xmlns="" id="{C614AFFF-8244-4128-8922-CE482606C7E0}"/>
+                <a16:creationId xmlns="" xmlns:a16="http://schemas.microsoft.com/office/drawing/2014/main" id="{C614AFFF-8244-4128-8922-CE482606C7E0}"/>
               </a:ext>
             </a:extLst>
           </p:cNvPr>
@@ -855,7 +1072,7 @@
           <a:p>
             <a:fld id="{344336C1-8F52-445D-867D-E04964D67636}" type="datetimeFigureOut">
               <a:rPr lang="he-IL" smtClean="0"/>
-              <a:t>ב'/חשון/תשפ"ב</a:t>
+              <a:t>ג'/חשון/תשפ"ב</a:t>
             </a:fld>
             <a:endParaRPr lang="he-IL"/>
           </a:p>
@@ -866,7 +1083,7 @@
           <p:cNvPr id="5" name="Footer Placeholder 4">
             <a:extLst>
               <a:ext uri="{FF2B5EF4-FFF2-40B4-BE49-F238E27FC236}">
-                <a16:creationId xmlns:a16="http://schemas.microsoft.com/office/drawing/2014/main" xmlns="" id="{8D865BE7-2D41-491D-BEBC-D73AD919F29E}"/>
+                <a16:creationId xmlns="" xmlns:a16="http://schemas.microsoft.com/office/drawing/2014/main" id="{8D865BE7-2D41-491D-BEBC-D73AD919F29E}"/>
               </a:ext>
             </a:extLst>
           </p:cNvPr>
@@ -891,7 +1108,7 @@
           <p:cNvPr id="6" name="Slide Number Placeholder 5">
             <a:extLst>
               <a:ext uri="{FF2B5EF4-FFF2-40B4-BE49-F238E27FC236}">
-                <a16:creationId xmlns:a16="http://schemas.microsoft.com/office/drawing/2014/main" xmlns="" id="{155477F8-7FF1-4173-A983-4F8D026DD1AC}"/>
+                <a16:creationId xmlns="" xmlns:a16="http://schemas.microsoft.com/office/drawing/2014/main" id="{155477F8-7FF1-4173-A983-4F8D026DD1AC}"/>
               </a:ext>
             </a:extLst>
           </p:cNvPr>
@@ -950,7 +1167,7 @@
           <p:cNvPr id="2" name="Title 1">
             <a:extLst>
               <a:ext uri="{FF2B5EF4-FFF2-40B4-BE49-F238E27FC236}">
-                <a16:creationId xmlns:a16="http://schemas.microsoft.com/office/drawing/2014/main" xmlns="" id="{D1999E5E-828D-488B-BA56-D4F0CEEFD69A}"/>
+                <a16:creationId xmlns="" xmlns:a16="http://schemas.microsoft.com/office/drawing/2014/main" id="{D1999E5E-828D-488B-BA56-D4F0CEEFD69A}"/>
               </a:ext>
             </a:extLst>
           </p:cNvPr>
@@ -979,7 +1196,7 @@
           <p:cNvPr id="3" name="Vertical Text Placeholder 2">
             <a:extLst>
               <a:ext uri="{FF2B5EF4-FFF2-40B4-BE49-F238E27FC236}">
-                <a16:creationId xmlns:a16="http://schemas.microsoft.com/office/drawing/2014/main" xmlns="" id="{4F12113A-E09F-449E-977B-2C3A2D6A493A}"/>
+                <a16:creationId xmlns="" xmlns:a16="http://schemas.microsoft.com/office/drawing/2014/main" id="{4F12113A-E09F-449E-977B-2C3A2D6A493A}"/>
               </a:ext>
             </a:extLst>
           </p:cNvPr>
@@ -1037,7 +1254,7 @@
           <p:cNvPr id="4" name="Date Placeholder 3">
             <a:extLst>
               <a:ext uri="{FF2B5EF4-FFF2-40B4-BE49-F238E27FC236}">
-                <a16:creationId xmlns:a16="http://schemas.microsoft.com/office/drawing/2014/main" xmlns="" id="{8276E691-89D4-4BE1-9AE7-026708FE11F5}"/>
+                <a16:creationId xmlns="" xmlns:a16="http://schemas.microsoft.com/office/drawing/2014/main" id="{8276E691-89D4-4BE1-9AE7-026708FE11F5}"/>
               </a:ext>
             </a:extLst>
           </p:cNvPr>
@@ -1055,7 +1272,7 @@
           <a:p>
             <a:fld id="{344336C1-8F52-445D-867D-E04964D67636}" type="datetimeFigureOut">
               <a:rPr lang="he-IL" smtClean="0"/>
-              <a:t>ב'/חשון/תשפ"ב</a:t>
+              <a:t>ג'/חשון/תשפ"ב</a:t>
             </a:fld>
             <a:endParaRPr lang="he-IL"/>
           </a:p>
@@ -1066,7 +1283,7 @@
           <p:cNvPr id="5" name="Footer Placeholder 4">
             <a:extLst>
               <a:ext uri="{FF2B5EF4-FFF2-40B4-BE49-F238E27FC236}">
-                <a16:creationId xmlns:a16="http://schemas.microsoft.com/office/drawing/2014/main" xmlns="" id="{34AE383C-A049-4B79-BBF8-589858F09EA0}"/>
+                <a16:creationId xmlns="" xmlns:a16="http://schemas.microsoft.com/office/drawing/2014/main" id="{34AE383C-A049-4B79-BBF8-589858F09EA0}"/>
               </a:ext>
             </a:extLst>
           </p:cNvPr>
@@ -1091,7 +1308,7 @@
           <p:cNvPr id="6" name="Slide Number Placeholder 5">
             <a:extLst>
               <a:ext uri="{FF2B5EF4-FFF2-40B4-BE49-F238E27FC236}">
-                <a16:creationId xmlns:a16="http://schemas.microsoft.com/office/drawing/2014/main" xmlns="" id="{D23E4976-003E-4C87-844A-AE00668CD515}"/>
+                <a16:creationId xmlns="" xmlns:a16="http://schemas.microsoft.com/office/drawing/2014/main" id="{D23E4976-003E-4C87-844A-AE00668CD515}"/>
               </a:ext>
             </a:extLst>
           </p:cNvPr>
@@ -1150,7 +1367,7 @@
           <p:cNvPr id="2" name="Vertical Title 1">
             <a:extLst>
               <a:ext uri="{FF2B5EF4-FFF2-40B4-BE49-F238E27FC236}">
-                <a16:creationId xmlns:a16="http://schemas.microsoft.com/office/drawing/2014/main" xmlns="" id="{76625240-D9EE-444B-859F-EBD39808E219}"/>
+                <a16:creationId xmlns="" xmlns:a16="http://schemas.microsoft.com/office/drawing/2014/main" id="{76625240-D9EE-444B-859F-EBD39808E219}"/>
               </a:ext>
             </a:extLst>
           </p:cNvPr>
@@ -1184,7 +1401,7 @@
           <p:cNvPr id="3" name="Vertical Text Placeholder 2">
             <a:extLst>
               <a:ext uri="{FF2B5EF4-FFF2-40B4-BE49-F238E27FC236}">
-                <a16:creationId xmlns:a16="http://schemas.microsoft.com/office/drawing/2014/main" xmlns="" id="{42497020-93EB-4494-82D7-226EAD156DB4}"/>
+                <a16:creationId xmlns="" xmlns:a16="http://schemas.microsoft.com/office/drawing/2014/main" id="{42497020-93EB-4494-82D7-226EAD156DB4}"/>
               </a:ext>
             </a:extLst>
           </p:cNvPr>
@@ -1247,7 +1464,7 @@
           <p:cNvPr id="4" name="Date Placeholder 3">
             <a:extLst>
               <a:ext uri="{FF2B5EF4-FFF2-40B4-BE49-F238E27FC236}">
-                <a16:creationId xmlns:a16="http://schemas.microsoft.com/office/drawing/2014/main" xmlns="" id="{00B28E31-9E4A-4BF9-8B53-6142307080BC}"/>
+                <a16:creationId xmlns="" xmlns:a16="http://schemas.microsoft.com/office/drawing/2014/main" id="{00B28E31-9E4A-4BF9-8B53-6142307080BC}"/>
               </a:ext>
             </a:extLst>
           </p:cNvPr>
@@ -1265,7 +1482,7 @@
           <a:p>
             <a:fld id="{344336C1-8F52-445D-867D-E04964D67636}" type="datetimeFigureOut">
               <a:rPr lang="he-IL" smtClean="0"/>
-              <a:t>ב'/חשון/תשפ"ב</a:t>
+              <a:t>ג'/חשון/תשפ"ב</a:t>
             </a:fld>
             <a:endParaRPr lang="he-IL"/>
           </a:p>
@@ -1276,7 +1493,7 @@
           <p:cNvPr id="5" name="Footer Placeholder 4">
             <a:extLst>
               <a:ext uri="{FF2B5EF4-FFF2-40B4-BE49-F238E27FC236}">
-                <a16:creationId xmlns:a16="http://schemas.microsoft.com/office/drawing/2014/main" xmlns="" id="{AA7FCAF7-45DC-49FD-B4B2-E3304432CF24}"/>
+                <a16:creationId xmlns="" xmlns:a16="http://schemas.microsoft.com/office/drawing/2014/main" id="{AA7FCAF7-45DC-49FD-B4B2-E3304432CF24}"/>
               </a:ext>
             </a:extLst>
           </p:cNvPr>
@@ -1301,7 +1518,7 @@
           <p:cNvPr id="6" name="Slide Number Placeholder 5">
             <a:extLst>
               <a:ext uri="{FF2B5EF4-FFF2-40B4-BE49-F238E27FC236}">
-                <a16:creationId xmlns:a16="http://schemas.microsoft.com/office/drawing/2014/main" xmlns="" id="{88EDE712-18A6-4F17-991D-7619794DAF90}"/>
+                <a16:creationId xmlns="" xmlns:a16="http://schemas.microsoft.com/office/drawing/2014/main" id="{88EDE712-18A6-4F17-991D-7619794DAF90}"/>
               </a:ext>
             </a:extLst>
           </p:cNvPr>
@@ -1360,7 +1577,7 @@
           <p:cNvPr id="2" name="Title 1">
             <a:extLst>
               <a:ext uri="{FF2B5EF4-FFF2-40B4-BE49-F238E27FC236}">
-                <a16:creationId xmlns:a16="http://schemas.microsoft.com/office/drawing/2014/main" xmlns="" id="{54355BA3-7F32-4FBA-95B0-CFF7D6205B6B}"/>
+                <a16:creationId xmlns="" xmlns:a16="http://schemas.microsoft.com/office/drawing/2014/main" id="{54355BA3-7F32-4FBA-95B0-CFF7D6205B6B}"/>
               </a:ext>
             </a:extLst>
           </p:cNvPr>
@@ -1389,7 +1606,7 @@
           <p:cNvPr id="3" name="Content Placeholder 2">
             <a:extLst>
               <a:ext uri="{FF2B5EF4-FFF2-40B4-BE49-F238E27FC236}">
-                <a16:creationId xmlns:a16="http://schemas.microsoft.com/office/drawing/2014/main" xmlns="" id="{18089CB2-A9B3-46B5-94A9-91FE98D0D9DD}"/>
+                <a16:creationId xmlns="" xmlns:a16="http://schemas.microsoft.com/office/drawing/2014/main" id="{18089CB2-A9B3-46B5-94A9-91FE98D0D9DD}"/>
               </a:ext>
             </a:extLst>
           </p:cNvPr>
@@ -1447,7 +1664,7 @@
           <p:cNvPr id="4" name="Date Placeholder 3">
             <a:extLst>
               <a:ext uri="{FF2B5EF4-FFF2-40B4-BE49-F238E27FC236}">
-                <a16:creationId xmlns:a16="http://schemas.microsoft.com/office/drawing/2014/main" xmlns="" id="{87F4459D-3506-42AC-B88D-F433BF97B209}"/>
+                <a16:creationId xmlns="" xmlns:a16="http://schemas.microsoft.com/office/drawing/2014/main" id="{87F4459D-3506-42AC-B88D-F433BF97B209}"/>
               </a:ext>
             </a:extLst>
           </p:cNvPr>
@@ -1465,7 +1682,7 @@
           <a:p>
             <a:fld id="{344336C1-8F52-445D-867D-E04964D67636}" type="datetimeFigureOut">
               <a:rPr lang="he-IL" smtClean="0"/>
-              <a:t>ב'/חשון/תשפ"ב</a:t>
+              <a:t>ג'/חשון/תשפ"ב</a:t>
             </a:fld>
             <a:endParaRPr lang="he-IL"/>
           </a:p>
@@ -1476,7 +1693,7 @@
           <p:cNvPr id="5" name="Footer Placeholder 4">
             <a:extLst>
               <a:ext uri="{FF2B5EF4-FFF2-40B4-BE49-F238E27FC236}">
-                <a16:creationId xmlns:a16="http://schemas.microsoft.com/office/drawing/2014/main" xmlns="" id="{BE43A69B-4860-4BCB-A1EF-DD495D5D9B84}"/>
+                <a16:creationId xmlns="" xmlns:a16="http://schemas.microsoft.com/office/drawing/2014/main" id="{BE43A69B-4860-4BCB-A1EF-DD495D5D9B84}"/>
               </a:ext>
             </a:extLst>
           </p:cNvPr>
@@ -1501,7 +1718,7 @@
           <p:cNvPr id="6" name="Slide Number Placeholder 5">
             <a:extLst>
               <a:ext uri="{FF2B5EF4-FFF2-40B4-BE49-F238E27FC236}">
-                <a16:creationId xmlns:a16="http://schemas.microsoft.com/office/drawing/2014/main" xmlns="" id="{6384AF72-0DC2-49F2-AE0A-0777BA9EC3D0}"/>
+                <a16:creationId xmlns="" xmlns:a16="http://schemas.microsoft.com/office/drawing/2014/main" id="{6384AF72-0DC2-49F2-AE0A-0777BA9EC3D0}"/>
               </a:ext>
             </a:extLst>
           </p:cNvPr>
@@ -1560,7 +1777,7 @@
           <p:cNvPr id="2" name="Title 1">
             <a:extLst>
               <a:ext uri="{FF2B5EF4-FFF2-40B4-BE49-F238E27FC236}">
-                <a16:creationId xmlns:a16="http://schemas.microsoft.com/office/drawing/2014/main" xmlns="" id="{D6FA6C00-2BC2-4E35-A1AB-8B6C3D7B8ED3}"/>
+                <a16:creationId xmlns="" xmlns:a16="http://schemas.microsoft.com/office/drawing/2014/main" id="{D6FA6C00-2BC2-4E35-A1AB-8B6C3D7B8ED3}"/>
               </a:ext>
             </a:extLst>
           </p:cNvPr>
@@ -1598,7 +1815,7 @@
           <p:cNvPr id="3" name="Text Placeholder 2">
             <a:extLst>
               <a:ext uri="{FF2B5EF4-FFF2-40B4-BE49-F238E27FC236}">
-                <a16:creationId xmlns:a16="http://schemas.microsoft.com/office/drawing/2014/main" xmlns="" id="{272E004D-8E5B-4B22-AB02-8AF0F80D8934}"/>
+                <a16:creationId xmlns="" xmlns:a16="http://schemas.microsoft.com/office/drawing/2014/main" id="{272E004D-8E5B-4B22-AB02-8AF0F80D8934}"/>
               </a:ext>
             </a:extLst>
           </p:cNvPr>
@@ -1723,7 +1940,7 @@
           <p:cNvPr id="4" name="Date Placeholder 3">
             <a:extLst>
               <a:ext uri="{FF2B5EF4-FFF2-40B4-BE49-F238E27FC236}">
-                <a16:creationId xmlns:a16="http://schemas.microsoft.com/office/drawing/2014/main" xmlns="" id="{8DA657B4-BEC8-4280-A6EE-F96DFE15F7AB}"/>
+                <a16:creationId xmlns="" xmlns:a16="http://schemas.microsoft.com/office/drawing/2014/main" id="{8DA657B4-BEC8-4280-A6EE-F96DFE15F7AB}"/>
               </a:ext>
             </a:extLst>
           </p:cNvPr>
@@ -1741,7 +1958,7 @@
           <a:p>
             <a:fld id="{344336C1-8F52-445D-867D-E04964D67636}" type="datetimeFigureOut">
               <a:rPr lang="he-IL" smtClean="0"/>
-              <a:t>ב'/חשון/תשפ"ב</a:t>
+              <a:t>ג'/חשון/תשפ"ב</a:t>
             </a:fld>
             <a:endParaRPr lang="he-IL"/>
           </a:p>
@@ -1752,7 +1969,7 @@
           <p:cNvPr id="5" name="Footer Placeholder 4">
             <a:extLst>
               <a:ext uri="{FF2B5EF4-FFF2-40B4-BE49-F238E27FC236}">
-                <a16:creationId xmlns:a16="http://schemas.microsoft.com/office/drawing/2014/main" xmlns="" id="{456B0BC1-3F16-4B85-9353-35D6B554F9FA}"/>
+                <a16:creationId xmlns="" xmlns:a16="http://schemas.microsoft.com/office/drawing/2014/main" id="{456B0BC1-3F16-4B85-9353-35D6B554F9FA}"/>
               </a:ext>
             </a:extLst>
           </p:cNvPr>
@@ -1777,7 +1994,7 @@
           <p:cNvPr id="6" name="Slide Number Placeholder 5">
             <a:extLst>
               <a:ext uri="{FF2B5EF4-FFF2-40B4-BE49-F238E27FC236}">
-                <a16:creationId xmlns:a16="http://schemas.microsoft.com/office/drawing/2014/main" xmlns="" id="{59FB0EEC-BD13-41A3-8FA1-5FB68CF84049}"/>
+                <a16:creationId xmlns="" xmlns:a16="http://schemas.microsoft.com/office/drawing/2014/main" id="{59FB0EEC-BD13-41A3-8FA1-5FB68CF84049}"/>
               </a:ext>
             </a:extLst>
           </p:cNvPr>
@@ -1836,7 +2053,7 @@
           <p:cNvPr id="2" name="Title 1">
             <a:extLst>
               <a:ext uri="{FF2B5EF4-FFF2-40B4-BE49-F238E27FC236}">
-                <a16:creationId xmlns:a16="http://schemas.microsoft.com/office/drawing/2014/main" xmlns="" id="{7E403A33-06D1-405A-9DF5-3F05919CD5B6}"/>
+                <a16:creationId xmlns="" xmlns:a16="http://schemas.microsoft.com/office/drawing/2014/main" id="{7E403A33-06D1-405A-9DF5-3F05919CD5B6}"/>
               </a:ext>
             </a:extLst>
           </p:cNvPr>
@@ -1865,7 +2082,7 @@
           <p:cNvPr id="3" name="Content Placeholder 2">
             <a:extLst>
               <a:ext uri="{FF2B5EF4-FFF2-40B4-BE49-F238E27FC236}">
-                <a16:creationId xmlns:a16="http://schemas.microsoft.com/office/drawing/2014/main" xmlns="" id="{EA5E21E9-969A-4529-9E01-EEBCB25E64F1}"/>
+                <a16:creationId xmlns="" xmlns:a16="http://schemas.microsoft.com/office/drawing/2014/main" id="{EA5E21E9-969A-4529-9E01-EEBCB25E64F1}"/>
               </a:ext>
             </a:extLst>
           </p:cNvPr>
@@ -1928,7 +2145,7 @@
           <p:cNvPr id="4" name="Content Placeholder 3">
             <a:extLst>
               <a:ext uri="{FF2B5EF4-FFF2-40B4-BE49-F238E27FC236}">
-                <a16:creationId xmlns:a16="http://schemas.microsoft.com/office/drawing/2014/main" xmlns="" id="{1701376C-1492-4A60-A3C3-F789C23C68B4}"/>
+                <a16:creationId xmlns="" xmlns:a16="http://schemas.microsoft.com/office/drawing/2014/main" id="{1701376C-1492-4A60-A3C3-F789C23C68B4}"/>
               </a:ext>
             </a:extLst>
           </p:cNvPr>
@@ -1991,7 +2208,7 @@
           <p:cNvPr id="5" name="Date Placeholder 4">
             <a:extLst>
               <a:ext uri="{FF2B5EF4-FFF2-40B4-BE49-F238E27FC236}">
-                <a16:creationId xmlns:a16="http://schemas.microsoft.com/office/drawing/2014/main" xmlns="" id="{E2B10881-4D02-4A2B-AEBE-63ED74484070}"/>
+                <a16:creationId xmlns="" xmlns:a16="http://schemas.microsoft.com/office/drawing/2014/main" id="{E2B10881-4D02-4A2B-AEBE-63ED74484070}"/>
               </a:ext>
             </a:extLst>
           </p:cNvPr>
@@ -2009,7 +2226,7 @@
           <a:p>
             <a:fld id="{344336C1-8F52-445D-867D-E04964D67636}" type="datetimeFigureOut">
               <a:rPr lang="he-IL" smtClean="0"/>
-              <a:t>ב'/חשון/תשפ"ב</a:t>
+              <a:t>ג'/חשון/תשפ"ב</a:t>
             </a:fld>
             <a:endParaRPr lang="he-IL"/>
           </a:p>
@@ -2020,7 +2237,7 @@
           <p:cNvPr id="6" name="Footer Placeholder 5">
             <a:extLst>
               <a:ext uri="{FF2B5EF4-FFF2-40B4-BE49-F238E27FC236}">
-                <a16:creationId xmlns:a16="http://schemas.microsoft.com/office/drawing/2014/main" xmlns="" id="{417BBB58-F0F9-4AE7-85A3-8AFE022FEFDF}"/>
+                <a16:creationId xmlns="" xmlns:a16="http://schemas.microsoft.com/office/drawing/2014/main" id="{417BBB58-F0F9-4AE7-85A3-8AFE022FEFDF}"/>
               </a:ext>
             </a:extLst>
           </p:cNvPr>
@@ -2045,7 +2262,7 @@
           <p:cNvPr id="7" name="Slide Number Placeholder 6">
             <a:extLst>
               <a:ext uri="{FF2B5EF4-FFF2-40B4-BE49-F238E27FC236}">
-                <a16:creationId xmlns:a16="http://schemas.microsoft.com/office/drawing/2014/main" xmlns="" id="{9913351C-4F17-4D55-B1BA-48859962A6D5}"/>
+                <a16:creationId xmlns="" xmlns:a16="http://schemas.microsoft.com/office/drawing/2014/main" id="{9913351C-4F17-4D55-B1BA-48859962A6D5}"/>
               </a:ext>
             </a:extLst>
           </p:cNvPr>
@@ -2104,7 +2321,7 @@
           <p:cNvPr id="2" name="Title 1">
             <a:extLst>
               <a:ext uri="{FF2B5EF4-FFF2-40B4-BE49-F238E27FC236}">
-                <a16:creationId xmlns:a16="http://schemas.microsoft.com/office/drawing/2014/main" xmlns="" id="{BE297A70-7674-46C2-9F68-E26E80F73F8D}"/>
+                <a16:creationId xmlns="" xmlns:a16="http://schemas.microsoft.com/office/drawing/2014/main" id="{BE297A70-7674-46C2-9F68-E26E80F73F8D}"/>
               </a:ext>
             </a:extLst>
           </p:cNvPr>
@@ -2138,7 +2355,7 @@
           <p:cNvPr id="3" name="Text Placeholder 2">
             <a:extLst>
               <a:ext uri="{FF2B5EF4-FFF2-40B4-BE49-F238E27FC236}">
-                <a16:creationId xmlns:a16="http://schemas.microsoft.com/office/drawing/2014/main" xmlns="" id="{7510B8AA-DECF-454D-AB17-BDD267F7C34C}"/>
+                <a16:creationId xmlns="" xmlns:a16="http://schemas.microsoft.com/office/drawing/2014/main" id="{7510B8AA-DECF-454D-AB17-BDD267F7C34C}"/>
               </a:ext>
             </a:extLst>
           </p:cNvPr>
@@ -2209,7 +2426,7 @@
           <p:cNvPr id="4" name="Content Placeholder 3">
             <a:extLst>
               <a:ext uri="{FF2B5EF4-FFF2-40B4-BE49-F238E27FC236}">
-                <a16:creationId xmlns:a16="http://schemas.microsoft.com/office/drawing/2014/main" xmlns="" id="{66B9C524-3023-412E-9D1E-07C2BF9405BC}"/>
+                <a16:creationId xmlns="" xmlns:a16="http://schemas.microsoft.com/office/drawing/2014/main" id="{66B9C524-3023-412E-9D1E-07C2BF9405BC}"/>
               </a:ext>
             </a:extLst>
           </p:cNvPr>
@@ -2272,7 +2489,7 @@
           <p:cNvPr id="5" name="Text Placeholder 4">
             <a:extLst>
               <a:ext uri="{FF2B5EF4-FFF2-40B4-BE49-F238E27FC236}">
-                <a16:creationId xmlns:a16="http://schemas.microsoft.com/office/drawing/2014/main" xmlns="" id="{AA82207C-DC7D-45C6-8744-0FEFFA79E3D8}"/>
+                <a16:creationId xmlns="" xmlns:a16="http://schemas.microsoft.com/office/drawing/2014/main" id="{AA82207C-DC7D-45C6-8744-0FEFFA79E3D8}"/>
               </a:ext>
             </a:extLst>
           </p:cNvPr>
@@ -2343,7 +2560,7 @@
           <p:cNvPr id="6" name="Content Placeholder 5">
             <a:extLst>
               <a:ext uri="{FF2B5EF4-FFF2-40B4-BE49-F238E27FC236}">
-                <a16:creationId xmlns:a16="http://schemas.microsoft.com/office/drawing/2014/main" xmlns="" id="{80EE7DBF-B197-4DF7-9C9E-CE3C3B46C33D}"/>
+                <a16:creationId xmlns="" xmlns:a16="http://schemas.microsoft.com/office/drawing/2014/main" id="{80EE7DBF-B197-4DF7-9C9E-CE3C3B46C33D}"/>
               </a:ext>
             </a:extLst>
           </p:cNvPr>
@@ -2406,7 +2623,7 @@
           <p:cNvPr id="7" name="Date Placeholder 6">
             <a:extLst>
               <a:ext uri="{FF2B5EF4-FFF2-40B4-BE49-F238E27FC236}">
-                <a16:creationId xmlns:a16="http://schemas.microsoft.com/office/drawing/2014/main" xmlns="" id="{559B344C-DD74-43E9-AB8E-455382E32074}"/>
+                <a16:creationId xmlns="" xmlns:a16="http://schemas.microsoft.com/office/drawing/2014/main" id="{559B344C-DD74-43E9-AB8E-455382E32074}"/>
               </a:ext>
             </a:extLst>
           </p:cNvPr>
@@ -2424,7 +2641,7 @@
           <a:p>
             <a:fld id="{344336C1-8F52-445D-867D-E04964D67636}" type="datetimeFigureOut">
               <a:rPr lang="he-IL" smtClean="0"/>
-              <a:t>ב'/חשון/תשפ"ב</a:t>
+              <a:t>ג'/חשון/תשפ"ב</a:t>
             </a:fld>
             <a:endParaRPr lang="he-IL"/>
           </a:p>
@@ -2435,7 +2652,7 @@
           <p:cNvPr id="8" name="Footer Placeholder 7">
             <a:extLst>
               <a:ext uri="{FF2B5EF4-FFF2-40B4-BE49-F238E27FC236}">
-                <a16:creationId xmlns:a16="http://schemas.microsoft.com/office/drawing/2014/main" xmlns="" id="{B7FD80DB-5173-45A5-904D-67E9692C2F63}"/>
+                <a16:creationId xmlns="" xmlns:a16="http://schemas.microsoft.com/office/drawing/2014/main" id="{B7FD80DB-5173-45A5-904D-67E9692C2F63}"/>
               </a:ext>
             </a:extLst>
           </p:cNvPr>
@@ -2460,7 +2677,7 @@
           <p:cNvPr id="9" name="Slide Number Placeholder 8">
             <a:extLst>
               <a:ext uri="{FF2B5EF4-FFF2-40B4-BE49-F238E27FC236}">
-                <a16:creationId xmlns:a16="http://schemas.microsoft.com/office/drawing/2014/main" xmlns="" id="{3BD89D5C-EC96-4469-A7AB-835DF8DACFB7}"/>
+                <a16:creationId xmlns="" xmlns:a16="http://schemas.microsoft.com/office/drawing/2014/main" id="{3BD89D5C-EC96-4469-A7AB-835DF8DACFB7}"/>
               </a:ext>
             </a:extLst>
           </p:cNvPr>
@@ -2519,7 +2736,7 @@
           <p:cNvPr id="2" name="Title 1">
             <a:extLst>
               <a:ext uri="{FF2B5EF4-FFF2-40B4-BE49-F238E27FC236}">
-                <a16:creationId xmlns:a16="http://schemas.microsoft.com/office/drawing/2014/main" xmlns="" id="{E4E145F3-AD47-4644-9C0C-5DD335BEE1F2}"/>
+                <a16:creationId xmlns="" xmlns:a16="http://schemas.microsoft.com/office/drawing/2014/main" id="{E4E145F3-AD47-4644-9C0C-5DD335BEE1F2}"/>
               </a:ext>
             </a:extLst>
           </p:cNvPr>
@@ -2548,7 +2765,7 @@
           <p:cNvPr id="3" name="Date Placeholder 2">
             <a:extLst>
               <a:ext uri="{FF2B5EF4-FFF2-40B4-BE49-F238E27FC236}">
-                <a16:creationId xmlns:a16="http://schemas.microsoft.com/office/drawing/2014/main" xmlns="" id="{2D8D1812-34FC-4A36-9AED-ABBEA16FAC53}"/>
+                <a16:creationId xmlns="" xmlns:a16="http://schemas.microsoft.com/office/drawing/2014/main" id="{2D8D1812-34FC-4A36-9AED-ABBEA16FAC53}"/>
               </a:ext>
             </a:extLst>
           </p:cNvPr>
@@ -2566,7 +2783,7 @@
           <a:p>
             <a:fld id="{344336C1-8F52-445D-867D-E04964D67636}" type="datetimeFigureOut">
               <a:rPr lang="he-IL" smtClean="0"/>
-              <a:t>ב'/חשון/תשפ"ב</a:t>
+              <a:t>ג'/חשון/תשפ"ב</a:t>
             </a:fld>
             <a:endParaRPr lang="he-IL"/>
           </a:p>
@@ -2577,7 +2794,7 @@
           <p:cNvPr id="4" name="Footer Placeholder 3">
             <a:extLst>
               <a:ext uri="{FF2B5EF4-FFF2-40B4-BE49-F238E27FC236}">
-                <a16:creationId xmlns:a16="http://schemas.microsoft.com/office/drawing/2014/main" xmlns="" id="{507D21B5-8871-4587-990D-479648292C9E}"/>
+                <a16:creationId xmlns="" xmlns:a16="http://schemas.microsoft.com/office/drawing/2014/main" id="{507D21B5-8871-4587-990D-479648292C9E}"/>
               </a:ext>
             </a:extLst>
           </p:cNvPr>
@@ -2602,7 +2819,7 @@
           <p:cNvPr id="5" name="Slide Number Placeholder 4">
             <a:extLst>
               <a:ext uri="{FF2B5EF4-FFF2-40B4-BE49-F238E27FC236}">
-                <a16:creationId xmlns:a16="http://schemas.microsoft.com/office/drawing/2014/main" xmlns="" id="{9AEE292B-E311-44EE-9908-B44B7D3114F7}"/>
+                <a16:creationId xmlns="" xmlns:a16="http://schemas.microsoft.com/office/drawing/2014/main" id="{9AEE292B-E311-44EE-9908-B44B7D3114F7}"/>
               </a:ext>
             </a:extLst>
           </p:cNvPr>
@@ -2661,7 +2878,7 @@
           <p:cNvPr id="2" name="Date Placeholder 1">
             <a:extLst>
               <a:ext uri="{FF2B5EF4-FFF2-40B4-BE49-F238E27FC236}">
-                <a16:creationId xmlns:a16="http://schemas.microsoft.com/office/drawing/2014/main" xmlns="" id="{4C1CC21C-68EA-4664-BB1B-7ED59EAF2A53}"/>
+                <a16:creationId xmlns="" xmlns:a16="http://schemas.microsoft.com/office/drawing/2014/main" id="{4C1CC21C-68EA-4664-BB1B-7ED59EAF2A53}"/>
               </a:ext>
             </a:extLst>
           </p:cNvPr>
@@ -2679,7 +2896,7 @@
           <a:p>
             <a:fld id="{344336C1-8F52-445D-867D-E04964D67636}" type="datetimeFigureOut">
               <a:rPr lang="he-IL" smtClean="0"/>
-              <a:t>ב'/חשון/תשפ"ב</a:t>
+              <a:t>ג'/חשון/תשפ"ב</a:t>
             </a:fld>
             <a:endParaRPr lang="he-IL"/>
           </a:p>
@@ -2690,7 +2907,7 @@
           <p:cNvPr id="3" name="Footer Placeholder 2">
             <a:extLst>
               <a:ext uri="{FF2B5EF4-FFF2-40B4-BE49-F238E27FC236}">
-                <a16:creationId xmlns:a16="http://schemas.microsoft.com/office/drawing/2014/main" xmlns="" id="{A237CCEE-6B9A-46BE-8E82-6EE6C2FCBD03}"/>
+                <a16:creationId xmlns="" xmlns:a16="http://schemas.microsoft.com/office/drawing/2014/main" id="{A237CCEE-6B9A-46BE-8E82-6EE6C2FCBD03}"/>
               </a:ext>
             </a:extLst>
           </p:cNvPr>
@@ -2715,7 +2932,7 @@
           <p:cNvPr id="4" name="Slide Number Placeholder 3">
             <a:extLst>
               <a:ext uri="{FF2B5EF4-FFF2-40B4-BE49-F238E27FC236}">
-                <a16:creationId xmlns:a16="http://schemas.microsoft.com/office/drawing/2014/main" xmlns="" id="{B99D8B72-DD40-425E-AB59-D7EA34762B90}"/>
+                <a16:creationId xmlns="" xmlns:a16="http://schemas.microsoft.com/office/drawing/2014/main" id="{B99D8B72-DD40-425E-AB59-D7EA34762B90}"/>
               </a:ext>
             </a:extLst>
           </p:cNvPr>
@@ -2774,7 +2991,7 @@
           <p:cNvPr id="2" name="Title 1">
             <a:extLst>
               <a:ext uri="{FF2B5EF4-FFF2-40B4-BE49-F238E27FC236}">
-                <a16:creationId xmlns:a16="http://schemas.microsoft.com/office/drawing/2014/main" xmlns="" id="{69A57D54-FA29-4CE8-A4B4-DD55EDD73A8A}"/>
+                <a16:creationId xmlns="" xmlns:a16="http://schemas.microsoft.com/office/drawing/2014/main" id="{69A57D54-FA29-4CE8-A4B4-DD55EDD73A8A}"/>
               </a:ext>
             </a:extLst>
           </p:cNvPr>
@@ -2812,7 +3029,7 @@
           <p:cNvPr id="3" name="Content Placeholder 2">
             <a:extLst>
               <a:ext uri="{FF2B5EF4-FFF2-40B4-BE49-F238E27FC236}">
-                <a16:creationId xmlns:a16="http://schemas.microsoft.com/office/drawing/2014/main" xmlns="" id="{E4FEC9BD-EABA-4F4D-AF4E-45D9DAE7BFAD}"/>
+                <a16:creationId xmlns="" xmlns:a16="http://schemas.microsoft.com/office/drawing/2014/main" id="{E4FEC9BD-EABA-4F4D-AF4E-45D9DAE7BFAD}"/>
               </a:ext>
             </a:extLst>
           </p:cNvPr>
@@ -2903,7 +3120,7 @@
           <p:cNvPr id="4" name="Text Placeholder 3">
             <a:extLst>
               <a:ext uri="{FF2B5EF4-FFF2-40B4-BE49-F238E27FC236}">
-                <a16:creationId xmlns:a16="http://schemas.microsoft.com/office/drawing/2014/main" xmlns="" id="{3D0082AF-C204-4B9F-B6A3-AC6FD24FA082}"/>
+                <a16:creationId xmlns="" xmlns:a16="http://schemas.microsoft.com/office/drawing/2014/main" id="{3D0082AF-C204-4B9F-B6A3-AC6FD24FA082}"/>
               </a:ext>
             </a:extLst>
           </p:cNvPr>
@@ -2974,7 +3191,7 @@
           <p:cNvPr id="5" name="Date Placeholder 4">
             <a:extLst>
               <a:ext uri="{FF2B5EF4-FFF2-40B4-BE49-F238E27FC236}">
-                <a16:creationId xmlns:a16="http://schemas.microsoft.com/office/drawing/2014/main" xmlns="" id="{1A18C4CB-8BAC-4512-BC39-498CFAB9F20F}"/>
+                <a16:creationId xmlns="" xmlns:a16="http://schemas.microsoft.com/office/drawing/2014/main" id="{1A18C4CB-8BAC-4512-BC39-498CFAB9F20F}"/>
               </a:ext>
             </a:extLst>
           </p:cNvPr>
@@ -2992,7 +3209,7 @@
           <a:p>
             <a:fld id="{344336C1-8F52-445D-867D-E04964D67636}" type="datetimeFigureOut">
               <a:rPr lang="he-IL" smtClean="0"/>
-              <a:t>ב'/חשון/תשפ"ב</a:t>
+              <a:t>ג'/חשון/תשפ"ב</a:t>
             </a:fld>
             <a:endParaRPr lang="he-IL"/>
           </a:p>
@@ -3003,7 +3220,7 @@
           <p:cNvPr id="6" name="Footer Placeholder 5">
             <a:extLst>
               <a:ext uri="{FF2B5EF4-FFF2-40B4-BE49-F238E27FC236}">
-                <a16:creationId xmlns:a16="http://schemas.microsoft.com/office/drawing/2014/main" xmlns="" id="{ED0E6FDA-8EE0-4D4C-AD05-5DD2EF1CAE9A}"/>
+                <a16:creationId xmlns="" xmlns:a16="http://schemas.microsoft.com/office/drawing/2014/main" id="{ED0E6FDA-8EE0-4D4C-AD05-5DD2EF1CAE9A}"/>
               </a:ext>
             </a:extLst>
           </p:cNvPr>
@@ -3028,7 +3245,7 @@
           <p:cNvPr id="7" name="Slide Number Placeholder 6">
             <a:extLst>
               <a:ext uri="{FF2B5EF4-FFF2-40B4-BE49-F238E27FC236}">
-                <a16:creationId xmlns:a16="http://schemas.microsoft.com/office/drawing/2014/main" xmlns="" id="{05E36145-CFC4-4C5F-87CF-8AC38A6141E9}"/>
+                <a16:creationId xmlns="" xmlns:a16="http://schemas.microsoft.com/office/drawing/2014/main" id="{05E36145-CFC4-4C5F-87CF-8AC38A6141E9}"/>
               </a:ext>
             </a:extLst>
           </p:cNvPr>
@@ -3087,7 +3304,7 @@
           <p:cNvPr id="2" name="Title 1">
             <a:extLst>
               <a:ext uri="{FF2B5EF4-FFF2-40B4-BE49-F238E27FC236}">
-                <a16:creationId xmlns:a16="http://schemas.microsoft.com/office/drawing/2014/main" xmlns="" id="{AD20933E-7AA1-4B16-B794-E31B0CB52456}"/>
+                <a16:creationId xmlns="" xmlns:a16="http://schemas.microsoft.com/office/drawing/2014/main" id="{AD20933E-7AA1-4B16-B794-E31B0CB52456}"/>
               </a:ext>
             </a:extLst>
           </p:cNvPr>
@@ -3125,7 +3342,7 @@
           <p:cNvPr id="3" name="Picture Placeholder 2">
             <a:extLst>
               <a:ext uri="{FF2B5EF4-FFF2-40B4-BE49-F238E27FC236}">
-                <a16:creationId xmlns:a16="http://schemas.microsoft.com/office/drawing/2014/main" xmlns="" id="{23C3E159-87FE-4316-AAA0-9FFCE4191A44}"/>
+                <a16:creationId xmlns="" xmlns:a16="http://schemas.microsoft.com/office/drawing/2014/main" id="{23C3E159-87FE-4316-AAA0-9FFCE4191A44}"/>
               </a:ext>
             </a:extLst>
           </p:cNvPr>
@@ -3192,7 +3409,7 @@
           <p:cNvPr id="4" name="Text Placeholder 3">
             <a:extLst>
               <a:ext uri="{FF2B5EF4-FFF2-40B4-BE49-F238E27FC236}">
-                <a16:creationId xmlns:a16="http://schemas.microsoft.com/office/drawing/2014/main" xmlns="" id="{564D42BC-C4F4-4D4B-AD10-7B767C877F97}"/>
+                <a16:creationId xmlns="" xmlns:a16="http://schemas.microsoft.com/office/drawing/2014/main" id="{564D42BC-C4F4-4D4B-AD10-7B767C877F97}"/>
               </a:ext>
             </a:extLst>
           </p:cNvPr>
@@ -3263,7 +3480,7 @@
           <p:cNvPr id="5" name="Date Placeholder 4">
             <a:extLst>
               <a:ext uri="{FF2B5EF4-FFF2-40B4-BE49-F238E27FC236}">
-                <a16:creationId xmlns:a16="http://schemas.microsoft.com/office/drawing/2014/main" xmlns="" id="{0F694630-1293-4F0E-918B-F9C907CF675E}"/>
+                <a16:creationId xmlns="" xmlns:a16="http://schemas.microsoft.com/office/drawing/2014/main" id="{0F694630-1293-4F0E-918B-F9C907CF675E}"/>
               </a:ext>
             </a:extLst>
           </p:cNvPr>
@@ -3281,7 +3498,7 @@
           <a:p>
             <a:fld id="{344336C1-8F52-445D-867D-E04964D67636}" type="datetimeFigureOut">
               <a:rPr lang="he-IL" smtClean="0"/>
-              <a:t>ב'/חשון/תשפ"ב</a:t>
+              <a:t>ג'/חשון/תשפ"ב</a:t>
             </a:fld>
             <a:endParaRPr lang="he-IL"/>
           </a:p>
@@ -3292,7 +3509,7 @@
           <p:cNvPr id="6" name="Footer Placeholder 5">
             <a:extLst>
               <a:ext uri="{FF2B5EF4-FFF2-40B4-BE49-F238E27FC236}">
-                <a16:creationId xmlns:a16="http://schemas.microsoft.com/office/drawing/2014/main" xmlns="" id="{31CF76AE-FD50-47F3-81D9-E012E228E271}"/>
+                <a16:creationId xmlns="" xmlns:a16="http://schemas.microsoft.com/office/drawing/2014/main" id="{31CF76AE-FD50-47F3-81D9-E012E228E271}"/>
               </a:ext>
             </a:extLst>
           </p:cNvPr>
@@ -3317,7 +3534,7 @@
           <p:cNvPr id="7" name="Slide Number Placeholder 6">
             <a:extLst>
               <a:ext uri="{FF2B5EF4-FFF2-40B4-BE49-F238E27FC236}">
-                <a16:creationId xmlns:a16="http://schemas.microsoft.com/office/drawing/2014/main" xmlns="" id="{C0C7866A-9698-4E28-B186-3EEBA55AF634}"/>
+                <a16:creationId xmlns="" xmlns:a16="http://schemas.microsoft.com/office/drawing/2014/main" id="{C0C7866A-9698-4E28-B186-3EEBA55AF634}"/>
               </a:ext>
             </a:extLst>
           </p:cNvPr>
@@ -3381,7 +3598,7 @@
           <p:cNvPr id="2" name="Title Placeholder 1">
             <a:extLst>
               <a:ext uri="{FF2B5EF4-FFF2-40B4-BE49-F238E27FC236}">
-                <a16:creationId xmlns:a16="http://schemas.microsoft.com/office/drawing/2014/main" xmlns="" id="{3BF51C83-AC46-43F5-84DD-5EA60A95AF44}"/>
+                <a16:creationId xmlns="" xmlns:a16="http://schemas.microsoft.com/office/drawing/2014/main" id="{3BF51C83-AC46-43F5-84DD-5EA60A95AF44}"/>
               </a:ext>
             </a:extLst>
           </p:cNvPr>
@@ -3420,7 +3637,7 @@
           <p:cNvPr id="3" name="Text Placeholder 2">
             <a:extLst>
               <a:ext uri="{FF2B5EF4-FFF2-40B4-BE49-F238E27FC236}">
-                <a16:creationId xmlns:a16="http://schemas.microsoft.com/office/drawing/2014/main" xmlns="" id="{204CE275-F58B-4D29-BD65-06CE7020880F}"/>
+                <a16:creationId xmlns="" xmlns:a16="http://schemas.microsoft.com/office/drawing/2014/main" id="{204CE275-F58B-4D29-BD65-06CE7020880F}"/>
               </a:ext>
             </a:extLst>
           </p:cNvPr>
@@ -3488,7 +3705,7 @@
           <p:cNvPr id="4" name="Date Placeholder 3">
             <a:extLst>
               <a:ext uri="{FF2B5EF4-FFF2-40B4-BE49-F238E27FC236}">
-                <a16:creationId xmlns:a16="http://schemas.microsoft.com/office/drawing/2014/main" xmlns="" id="{6C9A73D7-6490-464B-BD59-8EFF1D884374}"/>
+                <a16:creationId xmlns="" xmlns:a16="http://schemas.microsoft.com/office/drawing/2014/main" id="{6C9A73D7-6490-464B-BD59-8EFF1D884374}"/>
               </a:ext>
             </a:extLst>
           </p:cNvPr>
@@ -3524,7 +3741,7 @@
           <a:p>
             <a:fld id="{344336C1-8F52-445D-867D-E04964D67636}" type="datetimeFigureOut">
               <a:rPr lang="he-IL" smtClean="0"/>
-              <a:t>ב'/חשון/תשפ"ב</a:t>
+              <a:t>ג'/חשון/תשפ"ב</a:t>
             </a:fld>
             <a:endParaRPr lang="he-IL"/>
           </a:p>
@@ -3535,7 +3752,7 @@
           <p:cNvPr id="5" name="Footer Placeholder 4">
             <a:extLst>
               <a:ext uri="{FF2B5EF4-FFF2-40B4-BE49-F238E27FC236}">
-                <a16:creationId xmlns:a16="http://schemas.microsoft.com/office/drawing/2014/main" xmlns="" id="{DA06A976-ED5E-41F7-AF0A-05C42EF41C97}"/>
+                <a16:creationId xmlns="" xmlns:a16="http://schemas.microsoft.com/office/drawing/2014/main" id="{DA06A976-ED5E-41F7-AF0A-05C42EF41C97}"/>
               </a:ext>
             </a:extLst>
           </p:cNvPr>
@@ -3578,7 +3795,7 @@
           <p:cNvPr id="6" name="Slide Number Placeholder 5">
             <a:extLst>
               <a:ext uri="{FF2B5EF4-FFF2-40B4-BE49-F238E27FC236}">
-                <a16:creationId xmlns:a16="http://schemas.microsoft.com/office/drawing/2014/main" xmlns="" id="{B331C3B4-72CA-4739-B10D-7E6C591DDCE8}"/>
+                <a16:creationId xmlns="" xmlns:a16="http://schemas.microsoft.com/office/drawing/2014/main" id="{B331C3B4-72CA-4739-B10D-7E6C591DDCE8}"/>
               </a:ext>
             </a:extLst>
           </p:cNvPr>
@@ -3946,7 +4163,7 @@
           <p:cNvPr id="2" name="Title 1">
             <a:extLst>
               <a:ext uri="{FF2B5EF4-FFF2-40B4-BE49-F238E27FC236}">
-                <a16:creationId xmlns:a16="http://schemas.microsoft.com/office/drawing/2014/main" xmlns="" id="{E4E6708B-AEDF-46FB-AC71-B81DDDF5BAF5}"/>
+                <a16:creationId xmlns="" xmlns:a16="http://schemas.microsoft.com/office/drawing/2014/main" id="{E4E6708B-AEDF-46FB-AC71-B81DDDF5BAF5}"/>
               </a:ext>
             </a:extLst>
           </p:cNvPr>
@@ -3975,7 +4192,7 @@
           <p:cNvPr id="3" name="Subtitle 2">
             <a:extLst>
               <a:ext uri="{FF2B5EF4-FFF2-40B4-BE49-F238E27FC236}">
-                <a16:creationId xmlns:a16="http://schemas.microsoft.com/office/drawing/2014/main" xmlns="" id="{F9269047-9A86-476A-85E9-11A71CC3868D}"/>
+                <a16:creationId xmlns="" xmlns:a16="http://schemas.microsoft.com/office/drawing/2014/main" id="{F9269047-9A86-476A-85E9-11A71CC3868D}"/>
               </a:ext>
             </a:extLst>
           </p:cNvPr>
@@ -4028,7 +4245,7 @@
           <p:cNvPr id="4" name="Subtitle 2">
             <a:extLst>
               <a:ext uri="{FF2B5EF4-FFF2-40B4-BE49-F238E27FC236}">
-                <a16:creationId xmlns:a16="http://schemas.microsoft.com/office/drawing/2014/main" xmlns="" id="{F9269047-9A86-476A-85E9-11A71CC3868D}"/>
+                <a16:creationId xmlns="" xmlns:a16="http://schemas.microsoft.com/office/drawing/2014/main" id="{F9269047-9A86-476A-85E9-11A71CC3868D}"/>
               </a:ext>
             </a:extLst>
           </p:cNvPr>
@@ -4235,7 +4452,7 @@
           <p:cNvPr id="5" name="Subtitle 2">
             <a:extLst>
               <a:ext uri="{FF2B5EF4-FFF2-40B4-BE49-F238E27FC236}">
-                <a16:creationId xmlns:a16="http://schemas.microsoft.com/office/drawing/2014/main" xmlns="" id="{F9269047-9A86-476A-85E9-11A71CC3868D}"/>
+                <a16:creationId xmlns="" xmlns:a16="http://schemas.microsoft.com/office/drawing/2014/main" id="{F9269047-9A86-476A-85E9-11A71CC3868D}"/>
               </a:ext>
             </a:extLst>
           </p:cNvPr>
@@ -4486,7 +4703,7 @@
           <p:cNvPr id="2" name="Title 1">
             <a:extLst>
               <a:ext uri="{FF2B5EF4-FFF2-40B4-BE49-F238E27FC236}">
-                <a16:creationId xmlns:a16="http://schemas.microsoft.com/office/drawing/2014/main" xmlns="" id="{7BFAB48B-43C3-406C-87A8-4DED11CB7DA4}"/>
+                <a16:creationId xmlns="" xmlns:a16="http://schemas.microsoft.com/office/drawing/2014/main" id="{7BFAB48B-43C3-406C-87A8-4DED11CB7DA4}"/>
               </a:ext>
             </a:extLst>
           </p:cNvPr>
@@ -4515,7 +4732,7 @@
           <p:cNvPr id="3" name="Content Placeholder 2">
             <a:extLst>
               <a:ext uri="{FF2B5EF4-FFF2-40B4-BE49-F238E27FC236}">
-                <a16:creationId xmlns:a16="http://schemas.microsoft.com/office/drawing/2014/main" xmlns="" id="{E82E9076-7E34-4A3D-BD09-63E98FB86CD2}"/>
+                <a16:creationId xmlns="" xmlns:a16="http://schemas.microsoft.com/office/drawing/2014/main" id="{E82E9076-7E34-4A3D-BD09-63E98FB86CD2}"/>
               </a:ext>
             </a:extLst>
           </p:cNvPr>
@@ -4540,8 +4757,35 @@
               <a:t> </a:t>
             </a:r>
             <a:r>
-              <a:rPr lang="en-US" dirty="0" err="1"/>
+              <a:rPr lang="en-US" dirty="0" err="1" smtClean="0"/>
               <a:t>Alon</a:t>
+            </a:r>
+            <a:endParaRPr lang="en-US" dirty="0" smtClean="0"/>
+          </a:p>
+          <a:p>
+            <a:r>
+              <a:rPr lang="en-US" dirty="0" smtClean="0"/>
+              <a:t>Go neural!</a:t>
+            </a:r>
+          </a:p>
+          <a:p>
+            <a:r>
+              <a:rPr lang="en-US" dirty="0" smtClean="0"/>
+              <a:t>Run it at an early stage – on much less mature code</a:t>
+            </a:r>
+          </a:p>
+          <a:p>
+            <a:r>
+              <a:rPr lang="en-US" dirty="0" smtClean="0"/>
+              <a:t>One size fits all…? </a:t>
+            </a:r>
+            <a:r>
+              <a:rPr lang="en-US" smtClean="0"/>
+              <a:t>(implementation </a:t>
+            </a:r>
+            <a:r>
+              <a:rPr lang="en-US" dirty="0" smtClean="0"/>
+              <a:t>dependent features vs. more generic ones</a:t>
             </a:r>
             <a:endParaRPr lang="he-IL" dirty="0"/>
           </a:p>
@@ -4582,7 +4826,7 @@
           <p:cNvPr id="2" name="Title 1">
             <a:extLst>
               <a:ext uri="{FF2B5EF4-FFF2-40B4-BE49-F238E27FC236}">
-                <a16:creationId xmlns:a16="http://schemas.microsoft.com/office/drawing/2014/main" xmlns="" id="{02D7FC9E-5B2B-401E-853F-A30B32FF53CF}"/>
+                <a16:creationId xmlns="" xmlns:a16="http://schemas.microsoft.com/office/drawing/2014/main" id="{02D7FC9E-5B2B-401E-853F-A30B32FF53CF}"/>
               </a:ext>
             </a:extLst>
           </p:cNvPr>
@@ -4611,7 +4855,7 @@
           <p:cNvPr id="3" name="Content Placeholder 2">
             <a:extLst>
               <a:ext uri="{FF2B5EF4-FFF2-40B4-BE49-F238E27FC236}">
-                <a16:creationId xmlns:a16="http://schemas.microsoft.com/office/drawing/2014/main" xmlns="" id="{056C15BE-C8B1-4F7A-8A9E-618445265D45}"/>
+                <a16:creationId xmlns="" xmlns:a16="http://schemas.microsoft.com/office/drawing/2014/main" id="{056C15BE-C8B1-4F7A-8A9E-618445265D45}"/>
               </a:ext>
             </a:extLst>
           </p:cNvPr>
@@ -4700,7 +4944,7 @@
           <p:cNvPr id="2" name="Title 1">
             <a:extLst>
               <a:ext uri="{FF2B5EF4-FFF2-40B4-BE49-F238E27FC236}">
-                <a16:creationId xmlns:a16="http://schemas.microsoft.com/office/drawing/2014/main" xmlns="" id="{02D7FC9E-5B2B-401E-853F-A30B32FF53CF}"/>
+                <a16:creationId xmlns="" xmlns:a16="http://schemas.microsoft.com/office/drawing/2014/main" id="{02D7FC9E-5B2B-401E-853F-A30B32FF53CF}"/>
               </a:ext>
             </a:extLst>
           </p:cNvPr>
@@ -4729,7 +4973,7 @@
           <p:cNvPr id="3" name="Content Placeholder 2">
             <a:extLst>
               <a:ext uri="{FF2B5EF4-FFF2-40B4-BE49-F238E27FC236}">
-                <a16:creationId xmlns:a16="http://schemas.microsoft.com/office/drawing/2014/main" xmlns="" id="{056C15BE-C8B1-4F7A-8A9E-618445265D45}"/>
+                <a16:creationId xmlns="" xmlns:a16="http://schemas.microsoft.com/office/drawing/2014/main" id="{056C15BE-C8B1-4F7A-8A9E-618445265D45}"/>
               </a:ext>
             </a:extLst>
           </p:cNvPr>
@@ -4814,7 +5058,7 @@
           <p:cNvPr id="2" name="Title 1">
             <a:extLst>
               <a:ext uri="{FF2B5EF4-FFF2-40B4-BE49-F238E27FC236}">
-                <a16:creationId xmlns:a16="http://schemas.microsoft.com/office/drawing/2014/main" xmlns="" id="{E25FEAE0-E2A0-48D0-9FA8-4D154C0A19D1}"/>
+                <a16:creationId xmlns="" xmlns:a16="http://schemas.microsoft.com/office/drawing/2014/main" id="{E25FEAE0-E2A0-48D0-9FA8-4D154C0A19D1}"/>
               </a:ext>
             </a:extLst>
           </p:cNvPr>
@@ -4843,7 +5087,7 @@
           <p:cNvPr id="3" name="Content Placeholder 2">
             <a:extLst>
               <a:ext uri="{FF2B5EF4-FFF2-40B4-BE49-F238E27FC236}">
-                <a16:creationId xmlns:a16="http://schemas.microsoft.com/office/drawing/2014/main" xmlns="" id="{CAA1517C-BA7C-4BAD-9636-104A5CEEB010}"/>
+                <a16:creationId xmlns="" xmlns:a16="http://schemas.microsoft.com/office/drawing/2014/main" id="{CAA1517C-BA7C-4BAD-9636-104A5CEEB010}"/>
               </a:ext>
             </a:extLst>
           </p:cNvPr>
@@ -5032,7 +5276,7 @@
           <p:cNvPr id="2" name="Title 1">
             <a:extLst>
               <a:ext uri="{FF2B5EF4-FFF2-40B4-BE49-F238E27FC236}">
-                <a16:creationId xmlns:a16="http://schemas.microsoft.com/office/drawing/2014/main" xmlns="" id="{E25FEAE0-E2A0-48D0-9FA8-4D154C0A19D1}"/>
+                <a16:creationId xmlns="" xmlns:a16="http://schemas.microsoft.com/office/drawing/2014/main" id="{E25FEAE0-E2A0-48D0-9FA8-4D154C0A19D1}"/>
               </a:ext>
             </a:extLst>
           </p:cNvPr>
@@ -5061,7 +5305,7 @@
           <p:cNvPr id="3" name="Content Placeholder 2">
             <a:extLst>
               <a:ext uri="{FF2B5EF4-FFF2-40B4-BE49-F238E27FC236}">
-                <a16:creationId xmlns:a16="http://schemas.microsoft.com/office/drawing/2014/main" xmlns="" id="{CAA1517C-BA7C-4BAD-9636-104A5CEEB010}"/>
+                <a16:creationId xmlns="" xmlns:a16="http://schemas.microsoft.com/office/drawing/2014/main" id="{CAA1517C-BA7C-4BAD-9636-104A5CEEB010}"/>
               </a:ext>
             </a:extLst>
           </p:cNvPr>
@@ -5099,11 +5343,7 @@
           <a:p>
             <a:r>
               <a:rPr lang="en-US" dirty="0" smtClean="0"/>
-              <a:t>As an initial preprocessing step, it was aggregated to 3 different dat</a:t>
-            </a:r>
-            <a:r>
-              <a:rPr lang="en-US" dirty="0" smtClean="0"/>
-              <a:t>asets, identified by different filename prefixes:</a:t>
+              <a:t>As an initial preprocessing step, it was aggregated to 3 different datasets, identified by different filename prefixes:</a:t>
             </a:r>
           </a:p>
           <a:p>
@@ -5192,7 +5432,7 @@
           <p:cNvPr id="2" name="Title 1">
             <a:extLst>
               <a:ext uri="{FF2B5EF4-FFF2-40B4-BE49-F238E27FC236}">
-                <a16:creationId xmlns:a16="http://schemas.microsoft.com/office/drawing/2014/main" xmlns="" id="{E25FEAE0-E2A0-48D0-9FA8-4D154C0A19D1}"/>
+                <a16:creationId xmlns="" xmlns:a16="http://schemas.microsoft.com/office/drawing/2014/main" id="{E25FEAE0-E2A0-48D0-9FA8-4D154C0A19D1}"/>
               </a:ext>
             </a:extLst>
           </p:cNvPr>
@@ -5221,7 +5461,7 @@
           <p:cNvPr id="3" name="Content Placeholder 2">
             <a:extLst>
               <a:ext uri="{FF2B5EF4-FFF2-40B4-BE49-F238E27FC236}">
-                <a16:creationId xmlns:a16="http://schemas.microsoft.com/office/drawing/2014/main" xmlns="" id="{CAA1517C-BA7C-4BAD-9636-104A5CEEB010}"/>
+                <a16:creationId xmlns="" xmlns:a16="http://schemas.microsoft.com/office/drawing/2014/main" id="{CAA1517C-BA7C-4BAD-9636-104A5CEEB010}"/>
               </a:ext>
             </a:extLst>
           </p:cNvPr>
@@ -5245,7 +5485,6 @@
               <a:rPr lang="en-US" dirty="0" smtClean="0"/>
               <a:t> Rubi</a:t>
             </a:r>
-            <a:endParaRPr lang="en-US" dirty="0" smtClean="0"/>
           </a:p>
           <a:p>
             <a:pPr lvl="1"/>
@@ -5292,7 +5531,7 @@
           <p:cNvPr id="2" name="Title 1">
             <a:extLst>
               <a:ext uri="{FF2B5EF4-FFF2-40B4-BE49-F238E27FC236}">
-                <a16:creationId xmlns:a16="http://schemas.microsoft.com/office/drawing/2014/main" xmlns="" id="{0DAA2A36-562B-4C53-9B42-03B0AF7CE303}"/>
+                <a16:creationId xmlns="" xmlns:a16="http://schemas.microsoft.com/office/drawing/2014/main" id="{0DAA2A36-562B-4C53-9B42-03B0AF7CE303}"/>
               </a:ext>
             </a:extLst>
           </p:cNvPr>
@@ -5321,7 +5560,7 @@
           <p:cNvPr id="3" name="Content Placeholder 2">
             <a:extLst>
               <a:ext uri="{FF2B5EF4-FFF2-40B4-BE49-F238E27FC236}">
-                <a16:creationId xmlns:a16="http://schemas.microsoft.com/office/drawing/2014/main" xmlns="" id="{C6E48417-179C-4B87-BD7F-9E615FA65FE9}"/>
+                <a16:creationId xmlns="" xmlns:a16="http://schemas.microsoft.com/office/drawing/2014/main" id="{C6E48417-179C-4B87-BD7F-9E615FA65FE9}"/>
               </a:ext>
             </a:extLst>
           </p:cNvPr>
@@ -5384,7 +5623,7 @@
           <p:cNvPr id="2" name="Title 1">
             <a:extLst>
               <a:ext uri="{FF2B5EF4-FFF2-40B4-BE49-F238E27FC236}">
-                <a16:creationId xmlns:a16="http://schemas.microsoft.com/office/drawing/2014/main" xmlns="" id="{8D70A973-582F-4746-8C09-A3417CD1CEE0}"/>
+                <a16:creationId xmlns="" xmlns:a16="http://schemas.microsoft.com/office/drawing/2014/main" id="{8D70A973-582F-4746-8C09-A3417CD1CEE0}"/>
               </a:ext>
             </a:extLst>
           </p:cNvPr>
@@ -5413,7 +5652,7 @@
           <p:cNvPr id="3" name="Content Placeholder 2">
             <a:extLst>
               <a:ext uri="{FF2B5EF4-FFF2-40B4-BE49-F238E27FC236}">
-                <a16:creationId xmlns:a16="http://schemas.microsoft.com/office/drawing/2014/main" xmlns="" id="{B8688EDB-96C7-409F-B0D8-F74501A49933}"/>
+                <a16:creationId xmlns="" xmlns:a16="http://schemas.microsoft.com/office/drawing/2014/main" id="{B8688EDB-96C7-409F-B0D8-F74501A49933}"/>
               </a:ext>
             </a:extLst>
           </p:cNvPr>
@@ -5476,7 +5715,7 @@
           <p:cNvPr id="2" name="Title 1">
             <a:extLst>
               <a:ext uri="{FF2B5EF4-FFF2-40B4-BE49-F238E27FC236}">
-                <a16:creationId xmlns:a16="http://schemas.microsoft.com/office/drawing/2014/main" xmlns="" id="{A3FC8B73-D978-4D21-A456-8A0045662640}"/>
+                <a16:creationId xmlns="" xmlns:a16="http://schemas.microsoft.com/office/drawing/2014/main" id="{A3FC8B73-D978-4D21-A456-8A0045662640}"/>
               </a:ext>
             </a:extLst>
           </p:cNvPr>
@@ -5505,7 +5744,7 @@
           <p:cNvPr id="3" name="Content Placeholder 2">
             <a:extLst>
               <a:ext uri="{FF2B5EF4-FFF2-40B4-BE49-F238E27FC236}">
-                <a16:creationId xmlns:a16="http://schemas.microsoft.com/office/drawing/2014/main" xmlns="" id="{14731369-2BA4-4062-BAE9-91DF85C984F4}"/>
+                <a16:creationId xmlns="" xmlns:a16="http://schemas.microsoft.com/office/drawing/2014/main" id="{14731369-2BA4-4062-BAE9-91DF85C984F4}"/>
               </a:ext>
             </a:extLst>
           </p:cNvPr>
@@ -5522,17 +5761,63 @@
           <a:lstStyle/>
           <a:p>
             <a:r>
-              <a:rPr lang="en-US" dirty="0" err="1" smtClean="0"/>
-              <a:t>Todo</a:t>
-            </a:r>
-            <a:r>
               <a:rPr lang="en-US" dirty="0" smtClean="0"/>
+              <a:t>L</a:t>
+            </a:r>
+            <a:r>
+              <a:rPr lang="en-US" dirty="0" smtClean="0"/>
+              <a:t>ast in deed, but in thought – prime (English for </a:t>
+            </a:r>
+            <a:r>
+              <a:rPr lang="he-IL" dirty="0" smtClean="0"/>
+              <a:t>"סוף מעשה במחשבה תחילה"</a:t>
+            </a:r>
+            <a:r>
+              <a:rPr lang="en-US" dirty="0" smtClean="0"/>
+              <a:t>), which means:</a:t>
+            </a:r>
+          </a:p>
+          <a:p>
+            <a:endParaRPr lang="en-US" dirty="0" smtClean="0"/>
+          </a:p>
+          <a:p>
+            <a:r>
+              <a:rPr lang="en-US" dirty="0" smtClean="0"/>
+              <a:t>Balanced data matters</a:t>
+            </a:r>
+          </a:p>
+          <a:p>
+            <a:pPr lvl="2"/>
+            <a:r>
+              <a:rPr lang="en-US" dirty="0" smtClean="0"/>
+              <a:t>Produce it in the first place</a:t>
+            </a:r>
+          </a:p>
+          <a:p>
+            <a:pPr marL="914400" lvl="2" indent="0">
+              <a:buNone/>
+            </a:pPr>
+            <a:r>
+              <a:rPr lang="en-US" dirty="0"/>
               <a:t> </a:t>
             </a:r>
             <a:r>
-              <a:rPr lang="en-US" dirty="0" err="1" smtClean="0"/>
-              <a:t>Alon</a:t>
-            </a:r>
+              <a:rPr lang="en-US" dirty="0" smtClean="0"/>
+              <a:t>   And \ Or </a:t>
+            </a:r>
+          </a:p>
+          <a:p>
+            <a:pPr lvl="2"/>
+            <a:r>
+              <a:rPr lang="en-US" dirty="0" smtClean="0"/>
+              <a:t>Compensate for unbalanced data</a:t>
+            </a:r>
+          </a:p>
+          <a:p>
+            <a:pPr lvl="2"/>
+            <a:endParaRPr lang="en-US" dirty="0" smtClean="0"/>
+          </a:p>
+          <a:p>
             <a:endParaRPr lang="he-IL" dirty="0"/>
           </a:p>
         </p:txBody>

</xml_diff>

<commit_message>
Added notes under Future Work
</commit_message>
<xml_diff>
--- a/presentation/Demo_day_redhat_alon_rubi.pptx
+++ b/presentation/Demo_day_redhat_alon_rubi.pptx
@@ -914,6 +914,349 @@
     <p:extLst>
       <p:ext uri="{BB962C8B-B14F-4D97-AF65-F5344CB8AC3E}">
         <p14:creationId xmlns:p14="http://schemas.microsoft.com/office/powerpoint/2010/main" val="1757071743"/>
+      </p:ext>
+    </p:extLst>
+  </p:cSld>
+  <p:clrMapOvr>
+    <a:masterClrMapping/>
+  </p:clrMapOvr>
+</p:notes>
+</file>
+
+<file path=ppt/notesSlides/notesSlide4.xml><?xml version="1.0" encoding="utf-8"?>
+<p:notes xmlns:a="http://schemas.openxmlformats.org/drawingml/2006/main" xmlns:r="http://schemas.openxmlformats.org/officeDocument/2006/relationships" xmlns:p="http://schemas.openxmlformats.org/presentationml/2006/main">
+  <p:cSld>
+    <p:spTree>
+      <p:nvGrpSpPr>
+        <p:cNvPr id="1" name=""/>
+        <p:cNvGrpSpPr/>
+        <p:nvPr/>
+      </p:nvGrpSpPr>
+      <p:grpSpPr>
+        <a:xfrm>
+          <a:off x="0" y="0"/>
+          <a:ext cx="0" cy="0"/>
+          <a:chOff x="0" y="0"/>
+          <a:chExt cx="0" cy="0"/>
+        </a:xfrm>
+      </p:grpSpPr>
+      <p:sp>
+        <p:nvSpPr>
+          <p:cNvPr id="2" name="מציין מיקום של תמונת שקופית 1"/>
+          <p:cNvSpPr>
+            <a:spLocks noGrp="1" noRot="1" noChangeAspect="1"/>
+          </p:cNvSpPr>
+          <p:nvPr>
+            <p:ph type="sldImg"/>
+          </p:nvPr>
+        </p:nvSpPr>
+        <p:spPr/>
+      </p:sp>
+      <p:sp>
+        <p:nvSpPr>
+          <p:cNvPr id="3" name="מציין מיקום של הערות 2"/>
+          <p:cNvSpPr>
+            <a:spLocks noGrp="1"/>
+          </p:cNvSpPr>
+          <p:nvPr>
+            <p:ph type="body" idx="1"/>
+          </p:nvPr>
+        </p:nvSpPr>
+        <p:spPr/>
+        <p:txBody>
+          <a:bodyPr/>
+          <a:lstStyle/>
+          <a:p>
+            <a:pPr marL="0" marR="0" lvl="0" indent="0" algn="l" defTabSz="914400" rtl="0" eaLnBrk="1" fontAlgn="auto" latinLnBrk="0" hangingPunct="1">
+              <a:lnSpc>
+                <a:spcPct val="100000"/>
+              </a:lnSpc>
+              <a:spcBef>
+                <a:spcPts val="0"/>
+              </a:spcBef>
+              <a:spcAft>
+                <a:spcPts val="0"/>
+              </a:spcAft>
+              <a:buClrTx/>
+              <a:buSzTx/>
+              <a:buFontTx/>
+              <a:buNone/>
+              <a:tabLst/>
+              <a:defRPr/>
+            </a:pPr>
+            <a:r>
+              <a:rPr lang="en-US" b="1" u="sng" dirty="0" smtClean="0"/>
+              <a:t>Go neural!</a:t>
+            </a:r>
+          </a:p>
+          <a:p>
+            <a:pPr marL="0" marR="0" lvl="0" indent="0" algn="l" defTabSz="914400" rtl="0" eaLnBrk="1" fontAlgn="auto" latinLnBrk="0" hangingPunct="1">
+              <a:lnSpc>
+                <a:spcPct val="100000"/>
+              </a:lnSpc>
+              <a:spcBef>
+                <a:spcPts val="0"/>
+              </a:spcBef>
+              <a:spcAft>
+                <a:spcPts val="0"/>
+              </a:spcAft>
+              <a:buClrTx/>
+              <a:buSzTx/>
+              <a:buFontTx/>
+              <a:buNone/>
+              <a:tabLst/>
+              <a:defRPr/>
+            </a:pPr>
+            <a:r>
+              <a:rPr lang="en-US" b="0" u="none" dirty="0" smtClean="0"/>
+              <a:t>We</a:t>
+            </a:r>
+            <a:r>
+              <a:rPr lang="en-US" b="0" u="none" baseline="0" dirty="0" smtClean="0"/>
+              <a:t> ran it on </a:t>
+            </a:r>
+            <a:r>
+              <a:rPr lang="en-US" b="0" u="none" baseline="0" dirty="0" err="1" smtClean="0"/>
+              <a:t>xgboost</a:t>
+            </a:r>
+            <a:r>
+              <a:rPr lang="en-US" b="0" u="none" baseline="0" dirty="0" smtClean="0"/>
+              <a:t>, this is begging for a neural-network type </a:t>
+            </a:r>
+            <a:r>
+              <a:rPr lang="en-US" b="0" u="none" baseline="0" dirty="0" err="1" smtClean="0"/>
+              <a:t>implenetaion</a:t>
+            </a:r>
+            <a:r>
+              <a:rPr lang="en-US" b="0" u="none" baseline="0" smtClean="0"/>
+              <a:t>.</a:t>
+            </a:r>
+            <a:endParaRPr lang="en-US" b="0" u="none" dirty="0" smtClean="0"/>
+          </a:p>
+          <a:p>
+            <a:endParaRPr lang="en-US" b="1" u="sng" dirty="0" smtClean="0"/>
+          </a:p>
+          <a:p>
+            <a:endParaRPr lang="en-US" b="1" u="sng" dirty="0" smtClean="0"/>
+          </a:p>
+          <a:p>
+            <a:r>
+              <a:rPr lang="en-US" b="1" u="sng" dirty="0" smtClean="0"/>
+              <a:t>One size fits all…?</a:t>
+            </a:r>
+          </a:p>
+          <a:p>
+            <a:pPr rtl="0"/>
+            <a:r>
+              <a:rPr lang="en-US" sz="1200" b="0" i="0" u="none" strike="noStrike" kern="1200" dirty="0" smtClean="0">
+                <a:solidFill>
+                  <a:schemeClr val="tx1"/>
+                </a:solidFill>
+                <a:effectLst/>
+                <a:latin typeface="+mn-lt"/>
+                <a:ea typeface="+mn-ea"/>
+                <a:cs typeface="+mn-cs"/>
+              </a:rPr>
+              <a:t>Note: as for the features “</a:t>
+            </a:r>
+            <a:r>
+              <a:rPr lang="en-US" sz="1200" b="0" i="0" u="none" strike="noStrike" kern="1200" dirty="0" err="1" smtClean="0">
+                <a:solidFill>
+                  <a:schemeClr val="tx1"/>
+                </a:solidFill>
+                <a:effectLst/>
+                <a:latin typeface="+mn-lt"/>
+                <a:ea typeface="+mn-ea"/>
+                <a:cs typeface="+mn-cs"/>
+              </a:rPr>
+              <a:t>minimal_distnace</a:t>
+            </a:r>
+            <a:r>
+              <a:rPr lang="en-US" sz="1200" b="0" i="0" u="none" strike="noStrike" kern="1200" dirty="0" smtClean="0">
+                <a:solidFill>
+                  <a:schemeClr val="tx1"/>
+                </a:solidFill>
+                <a:effectLst/>
+                <a:latin typeface="+mn-lt"/>
+                <a:ea typeface="+mn-ea"/>
+                <a:cs typeface="+mn-cs"/>
+              </a:rPr>
+              <a:t>” and “</a:t>
+            </a:r>
+            <a:r>
+              <a:rPr lang="en-US" sz="1200" b="0" i="0" u="none" strike="noStrike" kern="1200" dirty="0" err="1" smtClean="0">
+                <a:solidFill>
+                  <a:schemeClr val="tx1"/>
+                </a:solidFill>
+                <a:effectLst/>
+                <a:latin typeface="+mn-lt"/>
+                <a:ea typeface="+mn-ea"/>
+                <a:cs typeface="+mn-cs"/>
+              </a:rPr>
+              <a:t>common_tokens</a:t>
+            </a:r>
+            <a:r>
+              <a:rPr lang="en-US" sz="1200" b="0" i="0" u="none" strike="noStrike" kern="1200" dirty="0" smtClean="0">
+                <a:solidFill>
+                  <a:schemeClr val="tx1"/>
+                </a:solidFill>
+                <a:effectLst/>
+                <a:latin typeface="+mn-lt"/>
+                <a:ea typeface="+mn-ea"/>
+                <a:cs typeface="+mn-cs"/>
+              </a:rPr>
+              <a:t>” - they are framework \ language \ implementation dependent. These features were chosen by </a:t>
+            </a:r>
+            <a:r>
+              <a:rPr lang="en-US" sz="1200" b="0" i="0" u="none" strike="noStrike" kern="1200" dirty="0" err="1" smtClean="0">
+                <a:solidFill>
+                  <a:schemeClr val="tx1"/>
+                </a:solidFill>
+                <a:effectLst/>
+                <a:latin typeface="+mn-lt"/>
+                <a:ea typeface="+mn-ea"/>
+                <a:cs typeface="+mn-cs"/>
+              </a:rPr>
+              <a:t>facebook</a:t>
+            </a:r>
+            <a:r>
+              <a:rPr lang="en-US" sz="1200" b="0" i="0" u="none" strike="noStrike" kern="1200" dirty="0" smtClean="0">
+                <a:solidFill>
+                  <a:schemeClr val="tx1"/>
+                </a:solidFill>
+                <a:effectLst/>
+                <a:latin typeface="+mn-lt"/>
+                <a:ea typeface="+mn-ea"/>
+                <a:cs typeface="+mn-cs"/>
+              </a:rPr>
+              <a:t> because:</a:t>
+            </a:r>
+            <a:endParaRPr lang="en-US" b="0" dirty="0" smtClean="0">
+              <a:effectLst/>
+            </a:endParaRPr>
+          </a:p>
+          <a:p>
+            <a:pPr rtl="0" fontAlgn="base"/>
+            <a:r>
+              <a:rPr lang="en-US" sz="1200" b="0" i="0" u="none" strike="noStrike" kern="1200" dirty="0" smtClean="0">
+                <a:solidFill>
+                  <a:schemeClr val="tx1"/>
+                </a:solidFill>
+                <a:effectLst/>
+                <a:latin typeface="+mn-lt"/>
+                <a:ea typeface="+mn-ea"/>
+                <a:cs typeface="+mn-cs"/>
+              </a:rPr>
+              <a:t>It “...approximates how close are changes to a given target and the significance of the impact on it” (in the case of minimal distance)</a:t>
+            </a:r>
+          </a:p>
+          <a:p>
+            <a:pPr rtl="0" fontAlgn="base"/>
+            <a:r>
+              <a:rPr lang="en-US" sz="1200" b="0" i="0" u="none" strike="noStrike" kern="1200" dirty="0" smtClean="0">
+                <a:solidFill>
+                  <a:schemeClr val="tx1"/>
+                </a:solidFill>
+                <a:effectLst/>
+                <a:latin typeface="+mn-lt"/>
+                <a:ea typeface="+mn-ea"/>
+                <a:cs typeface="+mn-cs"/>
+              </a:rPr>
+              <a:t>It Proxies “human perceived relevance” (in the case of common tokens)</a:t>
+            </a:r>
+          </a:p>
+          <a:p>
+            <a:pPr rtl="0"/>
+            <a:r>
+              <a:rPr lang="en-US" b="0" dirty="0" smtClean="0">
+                <a:effectLst/>
+              </a:rPr>
+              <a:t/>
+            </a:r>
+            <a:br>
+              <a:rPr lang="en-US" b="0" dirty="0" smtClean="0">
+                <a:effectLst/>
+              </a:rPr>
+            </a:br>
+            <a:r>
+              <a:rPr lang="en-US" sz="1200" b="0" i="0" u="none" strike="noStrike" kern="1200" dirty="0" smtClean="0">
+                <a:solidFill>
+                  <a:schemeClr val="tx1"/>
+                </a:solidFill>
+                <a:effectLst/>
+                <a:latin typeface="+mn-lt"/>
+                <a:ea typeface="+mn-ea"/>
+                <a:cs typeface="+mn-cs"/>
+              </a:rPr>
+              <a:t>In order to get similar insight from these features and to decouple the dependency in specific language etc., one should consider replacing \ adding a feature like “code coverage”. This means running a tool that, given a </a:t>
+            </a:r>
+            <a:r>
+              <a:rPr lang="en-US" sz="1200" b="0" i="0" u="none" strike="noStrike" kern="1200" dirty="0" err="1" smtClean="0">
+                <a:solidFill>
+                  <a:schemeClr val="tx1"/>
+                </a:solidFill>
+                <a:effectLst/>
+                <a:latin typeface="+mn-lt"/>
+                <a:ea typeface="+mn-ea"/>
+                <a:cs typeface="+mn-cs"/>
+              </a:rPr>
+              <a:t>changeset</a:t>
+            </a:r>
+            <a:r>
+              <a:rPr lang="en-US" sz="1200" b="0" i="0" u="none" strike="noStrike" kern="1200" dirty="0" smtClean="0">
+                <a:solidFill>
+                  <a:schemeClr val="tx1"/>
+                </a:solidFill>
+                <a:effectLst/>
+                <a:latin typeface="+mn-lt"/>
+                <a:ea typeface="+mn-ea"/>
+                <a:cs typeface="+mn-cs"/>
+              </a:rPr>
+              <a:t>, will output (approximately) how much code of the entire project is affected. </a:t>
+            </a:r>
+            <a:endParaRPr lang="en-US" b="0" dirty="0" smtClean="0">
+              <a:effectLst/>
+            </a:endParaRPr>
+          </a:p>
+          <a:p>
+            <a:r>
+              <a:rPr lang="en-US" dirty="0" smtClean="0"/>
+              <a:t/>
+            </a:r>
+            <a:br>
+              <a:rPr lang="en-US" dirty="0" smtClean="0"/>
+            </a:br>
+            <a:endParaRPr lang="en-US" dirty="0"/>
+          </a:p>
+        </p:txBody>
+      </p:sp>
+      <p:sp>
+        <p:nvSpPr>
+          <p:cNvPr id="4" name="מציין מיקום של מספר שקופית 3"/>
+          <p:cNvSpPr>
+            <a:spLocks noGrp="1"/>
+          </p:cNvSpPr>
+          <p:nvPr>
+            <p:ph type="sldNum" sz="quarter" idx="10"/>
+          </p:nvPr>
+        </p:nvSpPr>
+        <p:spPr/>
+        <p:txBody>
+          <a:bodyPr/>
+          <a:lstStyle/>
+          <a:p>
+            <a:fld id="{5D97A975-964D-4C88-9C64-5635FC4A030A}" type="slidenum">
+              <a:rPr lang="en-US" smtClean="0"/>
+              <a:t>10</a:t>
+            </a:fld>
+            <a:endParaRPr lang="en-US"/>
+          </a:p>
+        </p:txBody>
+      </p:sp>
+    </p:spTree>
+    <p:extLst>
+      <p:ext uri="{BB962C8B-B14F-4D97-AF65-F5344CB8AC3E}">
+        <p14:creationId xmlns:p14="http://schemas.microsoft.com/office/powerpoint/2010/main" val="2175745088"/>
       </p:ext>
     </p:extLst>
   </p:cSld>
@@ -4777,15 +5120,7 @@
           <a:p>
             <a:r>
               <a:rPr lang="en-US" dirty="0" smtClean="0"/>
-              <a:t>One size fits all…? </a:t>
-            </a:r>
-            <a:r>
-              <a:rPr lang="en-US" smtClean="0"/>
-              <a:t>(implementation </a:t>
-            </a:r>
-            <a:r>
-              <a:rPr lang="en-US" dirty="0" smtClean="0"/>
-              <a:t>dependent features vs. more generic ones</a:t>
+              <a:t>One size fits all…? (implementation dependent features vs. more generic ones</a:t>
             </a:r>
             <a:endParaRPr lang="he-IL" dirty="0"/>
           </a:p>

</xml_diff>